<commit_message>
Update date in Delivery slide
</commit_message>
<xml_diff>
--- a/Pragra_delivery.pptx
+++ b/Pragra_delivery.pptx
@@ -224,7 +224,7 @@
           <a:p>
             <a:fld id="{40E3F40A-43DE-4ECC-BA4B-FC08DD718DFB}" type="datetimeFigureOut">
               <a:rPr lang="en-US" smtClean="0"/>
-              <a:t>11-Nov-20</a:t>
+              <a:t>11/25/2020</a:t>
             </a:fld>
             <a:endParaRPr lang="en-US"/>
           </a:p>
@@ -14455,7 +14455,7 @@
         <p:spPr>
           <a:xfrm>
             <a:off x="10841470" y="1917886"/>
-            <a:ext cx="495328" cy="184666"/>
+            <a:ext cx="500137" cy="184666"/>
           </a:xfrm>
           <a:prstGeom prst="rect">
             <a:avLst/>
@@ -14503,7 +14503,7 @@
                 <a:cs typeface="Arial"/>
                 <a:sym typeface="Arial"/>
               </a:rPr>
-              <a:t>22-Jan</a:t>
+              <a:t>22-Feb</a:t>
             </a:r>
           </a:p>
         </p:txBody>

</xml_diff>